<commit_message>
gui & manage file
</commit_message>
<xml_diff>
--- a/Presentations/Proposal.pptx
+++ b/Presentations/Proposal.pptx
@@ -5,16 +5,16 @@
     <p:sldMasterId id="2147483648" r:id="rId1"/>
   </p:sldMasterIdLst>
   <p:notesMasterIdLst>
-    <p:notesMasterId r:id="rId8"/>
+    <p:notesMasterId r:id="rId9"/>
   </p:notesMasterIdLst>
   <p:sldIdLst>
-    <p:sldId id="256" r:id="rId3"/>
-    <p:sldId id="263" r:id="rId4"/>
-    <p:sldId id="257" r:id="rId5"/>
-    <p:sldId id="258" r:id="rId6"/>
-    <p:sldId id="259" r:id="rId7"/>
-    <p:sldId id="261" r:id="rId9"/>
-    <p:sldId id="262" r:id="rId10"/>
+    <p:sldId id="256" r:id="rId2"/>
+    <p:sldId id="263" r:id="rId3"/>
+    <p:sldId id="257" r:id="rId4"/>
+    <p:sldId id="258" r:id="rId5"/>
+    <p:sldId id="259" r:id="rId6"/>
+    <p:sldId id="261" r:id="rId7"/>
+    <p:sldId id="262" r:id="rId8"/>
   </p:sldIdLst>
   <p:sldSz cx="12192000" cy="6858000"/>
   <p:notesSz cx="6858000" cy="9144000"/>
@@ -113,6 +113,11 @@
       </a:defRPr>
     </a:lvl9pPr>
   </p:defaultTextStyle>
+  <p:extLst>
+    <p:ext uri="{EFAFB233-063F-42B5-8137-9DF3F51BA10A}">
+      <p15:sldGuideLst xmlns:p15="http://schemas.microsoft.com/office/powerpoint/2012/main"/>
+    </p:ext>
+  </p:extLst>
 </p:presentation>
 </file>
 
@@ -198,6 +203,7 @@
           <a:p>
             <a:fld id="{813A0A7A-E345-4055-B76E-47B5CF084559}" type="datetimeFigureOut">
               <a:rPr lang="en-US"/>
+              <a:t>5/20/2020</a:t>
             </a:fld>
             <a:endParaRPr lang="en-US"/>
           </a:p>
@@ -264,7 +270,6 @@
               <a:rPr lang="en-US"/>
               <a:t>Click to edit Master text styles</a:t>
             </a:r>
-            <a:endParaRPr lang="en-US"/>
           </a:p>
           <a:p>
             <a:pPr lvl="1"/>
@@ -272,7 +277,6 @@
               <a:rPr lang="en-US"/>
               <a:t>Second level</a:t>
             </a:r>
-            <a:endParaRPr lang="en-US"/>
           </a:p>
           <a:p>
             <a:pPr lvl="2"/>
@@ -280,7 +284,6 @@
               <a:rPr lang="en-US"/>
               <a:t>Third level</a:t>
             </a:r>
-            <a:endParaRPr lang="en-US"/>
           </a:p>
           <a:p>
             <a:pPr lvl="3"/>
@@ -288,7 +291,6 @@
               <a:rPr lang="en-US"/>
               <a:t>Fourth level</a:t>
             </a:r>
-            <a:endParaRPr lang="en-US"/>
           </a:p>
           <a:p>
             <a:pPr lvl="4"/>
@@ -296,7 +298,6 @@
               <a:rPr lang="en-US"/>
               <a:t>Fifth level</a:t>
             </a:r>
-            <a:endParaRPr lang="en-US"/>
           </a:p>
         </p:txBody>
       </p:sp>
@@ -360,6 +361,7 @@
           <a:p>
             <a:fld id="{55722BE5-57AA-451B-8B85-B1F747DB0733}" type="slidenum">
               <a:rPr lang="en-US"/>
+              <a:t>‹#›</a:t>
             </a:fld>
             <a:endParaRPr lang="en-US"/>
           </a:p>
@@ -472,11 +474,20 @@
         <p:cNvGrpSpPr/>
         <p:nvPr/>
       </p:nvGrpSpPr>
-      <p:grpSpPr/>
+      <p:grpSpPr>
+        <a:xfrm>
+          <a:off x="0" y="0"/>
+          <a:ext cx="0" cy="0"/>
+          <a:chOff x="0" y="0"/>
+          <a:chExt cx="0" cy="0"/>
+        </a:xfrm>
+      </p:grpSpPr>
       <p:sp>
         <p:nvSpPr>
           <p:cNvPr id="2" name="Slide Image Placeholder 1"/>
-          <p:cNvSpPr/>
+          <p:cNvSpPr>
+            <a:spLocks noGrp="1" noRot="1" noChangeAspect="1"/>
+          </p:cNvSpPr>
           <p:nvPr>
             <p:ph type="sldImg" idx="2"/>
           </p:nvPr>
@@ -486,7 +497,9 @@
       <p:sp>
         <p:nvSpPr>
           <p:cNvPr id="3" name="Text Placeholder 2"/>
-          <p:cNvSpPr/>
+          <p:cNvSpPr>
+            <a:spLocks noGrp="1"/>
+          </p:cNvSpPr>
           <p:nvPr>
             <p:ph type="body" idx="3"/>
           </p:nvPr>
@@ -494,6 +507,7 @@
         <p:spPr/>
         <p:txBody>
           <a:bodyPr/>
+          <a:lstStyle/>
           <a:p>
             <a:endParaRPr lang="en-US"/>
           </a:p>
@@ -570,7 +584,6 @@
               <a:rPr lang="en-US"/>
               <a:t> ide program</a:t>
             </a:r>
-            <a:endParaRPr lang="en-US"/>
           </a:p>
           <a:p>
             <a:pPr marL="285750" indent="-285750">
@@ -608,7 +621,6 @@
               <a:rPr lang="en-US"/>
               <a:t> GUI </a:t>
             </a:r>
-            <a:endParaRPr lang="en-US"/>
           </a:p>
           <a:p>
             <a:pPr marL="285750" indent="-285750">
@@ -638,7 +650,6 @@
               <a:rPr lang="en-US"/>
               <a:t> http server, ftp server dan chat</a:t>
             </a:r>
-            <a:endParaRPr lang="en-US"/>
           </a:p>
           <a:p>
             <a:pPr marL="285750" indent="-285750">
@@ -676,7 +687,6 @@
               <a:rPr lang="en-US"/>
               <a:t> program</a:t>
             </a:r>
-            <a:endParaRPr lang="en-US"/>
           </a:p>
         </p:txBody>
       </p:sp>
@@ -697,6 +707,7 @@
           <a:p>
             <a:fld id="{55722BE5-57AA-451B-8B85-B1F747DB0733}" type="slidenum">
               <a:rPr lang="en-US"/>
+              <a:t>6</a:t>
             </a:fld>
             <a:endParaRPr lang="en-US"/>
           </a:p>
@@ -755,7 +766,6 @@
               <a:rPr lang="en-US" dirty="0"/>
               <a:t>Click to edit Master title style</a:t>
             </a:r>
-            <a:endParaRPr lang="en-US" dirty="0"/>
           </a:p>
         </p:txBody>
       </p:sp>
@@ -875,7 +885,6 @@
               <a:rPr lang="en-US" dirty="0"/>
               <a:t>Click to edit Master subtitle style</a:t>
             </a:r>
-            <a:endParaRPr lang="en-US" dirty="0"/>
           </a:p>
         </p:txBody>
       </p:sp>
@@ -896,6 +905,7 @@
           <a:p>
             <a:fld id="{4AAD347D-5ACD-4C99-B74B-A9C85AD731AF}" type="datetimeFigureOut">
               <a:rPr lang="en-US" dirty="0"/>
+              <a:t>5/20/2020</a:t>
             </a:fld>
             <a:endParaRPr lang="en-US" dirty="0"/>
           </a:p>
@@ -937,6 +947,7 @@
           <a:p>
             <a:fld id="{D57F1E4F-1CFF-5643-939E-02111984F565}" type="slidenum">
               <a:rPr lang="en-US" dirty="0"/>
+              <a:t>‹#›</a:t>
             </a:fld>
             <a:endParaRPr lang="en-US" dirty="0"/>
           </a:p>
@@ -997,7 +1008,6 @@
               <a:rPr lang="en-US" dirty="0"/>
               <a:t>Click to edit Master title style</a:t>
             </a:r>
-            <a:endParaRPr lang="en-US" dirty="0"/>
           </a:p>
         </p:txBody>
       </p:sp>
@@ -1140,7 +1150,6 @@
               <a:rPr lang="en-US" dirty="0"/>
               <a:t>Click to edit Master text styles</a:t>
             </a:r>
-            <a:endParaRPr lang="en-US" dirty="0"/>
           </a:p>
         </p:txBody>
       </p:sp>
@@ -1161,6 +1170,7 @@
           <a:p>
             <a:fld id="{4509A250-FF31-4206-8172-F9D3106AACB1}" type="datetimeFigureOut">
               <a:rPr lang="en-US" dirty="0"/>
+              <a:t>5/20/2020</a:t>
             </a:fld>
             <a:endParaRPr lang="en-US" dirty="0"/>
           </a:p>
@@ -1202,6 +1212,7 @@
           <a:p>
             <a:fld id="{D57F1E4F-1CFF-5643-939E-02111984F565}" type="slidenum">
               <a:rPr lang="en-US" dirty="0"/>
+              <a:t>‹#›</a:t>
             </a:fld>
             <a:endParaRPr lang="en-US" dirty="0"/>
           </a:p>
@@ -1260,7 +1271,6 @@
               <a:rPr lang="en-US" dirty="0"/>
               <a:t>Click to edit Master title style</a:t>
             </a:r>
-            <a:endParaRPr lang="en-US" dirty="0"/>
           </a:p>
         </p:txBody>
       </p:sp>
@@ -1328,7 +1338,6 @@
               <a:rPr lang="en-US" dirty="0"/>
               <a:t>Click to edit Master text styles</a:t>
             </a:r>
-            <a:endParaRPr lang="en-US" dirty="0"/>
           </a:p>
         </p:txBody>
       </p:sp>
@@ -1349,6 +1358,7 @@
           <a:p>
             <a:fld id="{4509A250-FF31-4206-8172-F9D3106AACB1}" type="datetimeFigureOut">
               <a:rPr lang="en-US" dirty="0"/>
+              <a:t>5/20/2020</a:t>
             </a:fld>
             <a:endParaRPr lang="en-US" dirty="0"/>
           </a:p>
@@ -1390,6 +1400,7 @@
           <a:p>
             <a:fld id="{D57F1E4F-1CFF-5643-939E-02111984F565}" type="slidenum">
               <a:rPr lang="en-US" dirty="0"/>
+              <a:t>‹#›</a:t>
             </a:fld>
             <a:endParaRPr lang="en-US" dirty="0"/>
           </a:p>
@@ -1448,7 +1459,6 @@
               <a:rPr lang="en-US" dirty="0"/>
               <a:t>Click to edit Master title style</a:t>
             </a:r>
-            <a:endParaRPr lang="en-US" dirty="0"/>
           </a:p>
         </p:txBody>
       </p:sp>
@@ -1528,7 +1538,6 @@
               <a:rPr lang="en-US" dirty="0"/>
               <a:t>Click to edit Master text styles</a:t>
             </a:r>
-            <a:endParaRPr lang="en-US" dirty="0"/>
           </a:p>
         </p:txBody>
       </p:sp>
@@ -1596,7 +1605,6 @@
               <a:rPr lang="en-US" dirty="0"/>
               <a:t>Click to edit Master text styles</a:t>
             </a:r>
-            <a:endParaRPr lang="en-US" dirty="0"/>
           </a:p>
         </p:txBody>
       </p:sp>
@@ -1617,6 +1625,7 @@
           <a:p>
             <a:fld id="{4509A250-FF31-4206-8172-F9D3106AACB1}" type="datetimeFigureOut">
               <a:rPr lang="en-US" dirty="0"/>
+              <a:t>5/20/2020</a:t>
             </a:fld>
             <a:endParaRPr lang="en-US" dirty="0"/>
           </a:p>
@@ -1658,6 +1667,7 @@
           <a:p>
             <a:fld id="{D57F1E4F-1CFF-5643-939E-02111984F565}" type="slidenum">
               <a:rPr lang="en-US" dirty="0"/>
+              <a:t>‹#›</a:t>
             </a:fld>
             <a:endParaRPr lang="en-US" dirty="0"/>
           </a:p>
@@ -1707,7 +1717,6 @@
               <a:rPr lang="en-US" dirty="0"/>
               <a:t>“</a:t>
             </a:r>
-            <a:endParaRPr lang="en-US" dirty="0"/>
           </a:p>
         </p:txBody>
       </p:sp>
@@ -1755,7 +1764,6 @@
               <a:rPr lang="en-US" dirty="0"/>
               <a:t>”</a:t>
             </a:r>
-            <a:endParaRPr lang="en-US" dirty="0"/>
           </a:p>
         </p:txBody>
       </p:sp>
@@ -1812,7 +1820,6 @@
               <a:rPr lang="en-US" dirty="0"/>
               <a:t>Click to edit Master title style</a:t>
             </a:r>
-            <a:endParaRPr lang="en-US" dirty="0"/>
           </a:p>
         </p:txBody>
       </p:sp>
@@ -1933,7 +1940,6 @@
               <a:rPr lang="en-US" dirty="0"/>
               <a:t>Click to edit Master text styles</a:t>
             </a:r>
-            <a:endParaRPr lang="en-US" dirty="0"/>
           </a:p>
         </p:txBody>
       </p:sp>
@@ -1954,6 +1960,7 @@
           <a:p>
             <a:fld id="{4509A250-FF31-4206-8172-F9D3106AACB1}" type="datetimeFigureOut">
               <a:rPr lang="en-US" dirty="0"/>
+              <a:t>5/20/2020</a:t>
             </a:fld>
             <a:endParaRPr lang="en-US" dirty="0"/>
           </a:p>
@@ -1995,6 +2002,7 @@
           <a:p>
             <a:fld id="{D57F1E4F-1CFF-5643-939E-02111984F565}" type="slidenum">
               <a:rPr lang="en-US" dirty="0"/>
+              <a:t>‹#›</a:t>
             </a:fld>
             <a:endParaRPr lang="en-US" dirty="0"/>
           </a:p>
@@ -2048,7 +2056,6 @@
               <a:rPr lang="en-US" dirty="0"/>
               <a:t>Click to edit Master title style</a:t>
             </a:r>
-            <a:endParaRPr lang="en-US" dirty="0"/>
           </a:p>
         </p:txBody>
       </p:sp>
@@ -2123,7 +2130,6 @@
               <a:rPr lang="en-US" dirty="0"/>
               <a:t>Click to edit Master text styles</a:t>
             </a:r>
-            <a:endParaRPr lang="en-US" dirty="0"/>
           </a:p>
         </p:txBody>
       </p:sp>
@@ -2191,7 +2197,6 @@
               <a:rPr lang="en-US" dirty="0"/>
               <a:t>Click to edit Master text styles</a:t>
             </a:r>
-            <a:endParaRPr lang="en-US" dirty="0"/>
           </a:p>
         </p:txBody>
       </p:sp>
@@ -2266,7 +2271,6 @@
               <a:rPr lang="en-US" dirty="0"/>
               <a:t>Click to edit Master text styles</a:t>
             </a:r>
-            <a:endParaRPr lang="en-US" dirty="0"/>
           </a:p>
         </p:txBody>
       </p:sp>
@@ -2334,7 +2338,6 @@
               <a:rPr lang="en-US" dirty="0"/>
               <a:t>Click to edit Master text styles</a:t>
             </a:r>
-            <a:endParaRPr lang="en-US" dirty="0"/>
           </a:p>
         </p:txBody>
       </p:sp>
@@ -2409,7 +2412,6 @@
               <a:rPr lang="en-US" dirty="0"/>
               <a:t>Click to edit Master text styles</a:t>
             </a:r>
-            <a:endParaRPr lang="en-US" dirty="0"/>
           </a:p>
         </p:txBody>
       </p:sp>
@@ -2477,7 +2479,6 @@
               <a:rPr lang="en-US" dirty="0"/>
               <a:t>Click to edit Master text styles</a:t>
             </a:r>
-            <a:endParaRPr lang="en-US" dirty="0"/>
           </a:p>
         </p:txBody>
       </p:sp>
@@ -2576,6 +2577,7 @@
           <a:p>
             <a:fld id="{4509A250-FF31-4206-8172-F9D3106AACB1}" type="datetimeFigureOut">
               <a:rPr lang="en-US" dirty="0"/>
+              <a:t>5/20/2020</a:t>
             </a:fld>
             <a:endParaRPr lang="en-US" dirty="0"/>
           </a:p>
@@ -2617,6 +2619,7 @@
           <a:p>
             <a:fld id="{D57F1E4F-1CFF-5643-939E-02111984F565}" type="slidenum">
               <a:rPr lang="en-US" dirty="0"/>
+              <a:t>‹#›</a:t>
             </a:fld>
             <a:endParaRPr lang="en-US" dirty="0"/>
           </a:p>
@@ -2670,7 +2673,6 @@
               <a:rPr lang="en-US" dirty="0"/>
               <a:t>Click to edit Master title style</a:t>
             </a:r>
-            <a:endParaRPr lang="en-US" dirty="0"/>
           </a:p>
         </p:txBody>
       </p:sp>
@@ -2745,7 +2747,6 @@
               <a:rPr lang="en-US" dirty="0"/>
               <a:t>Click to edit Master text styles</a:t>
             </a:r>
-            <a:endParaRPr lang="en-US" dirty="0"/>
           </a:p>
         </p:txBody>
       </p:sp>
@@ -2888,7 +2889,6 @@
               <a:rPr lang="en-US" dirty="0"/>
               <a:t>Click to edit Master text styles</a:t>
             </a:r>
-            <a:endParaRPr lang="en-US" dirty="0"/>
           </a:p>
         </p:txBody>
       </p:sp>
@@ -2963,7 +2963,6 @@
               <a:rPr lang="en-US" dirty="0"/>
               <a:t>Click to edit Master text styles</a:t>
             </a:r>
-            <a:endParaRPr lang="en-US" dirty="0"/>
           </a:p>
         </p:txBody>
       </p:sp>
@@ -3106,7 +3105,6 @@
               <a:rPr lang="en-US" dirty="0"/>
               <a:t>Click to edit Master text styles</a:t>
             </a:r>
-            <a:endParaRPr lang="en-US" dirty="0"/>
           </a:p>
         </p:txBody>
       </p:sp>
@@ -3181,7 +3179,6 @@
               <a:rPr lang="en-US" dirty="0"/>
               <a:t>Click to edit Master text styles</a:t>
             </a:r>
-            <a:endParaRPr lang="en-US" dirty="0"/>
           </a:p>
         </p:txBody>
       </p:sp>
@@ -3324,7 +3321,6 @@
               <a:rPr lang="en-US" dirty="0"/>
               <a:t>Click to edit Master text styles</a:t>
             </a:r>
-            <a:endParaRPr lang="en-US" dirty="0"/>
           </a:p>
         </p:txBody>
       </p:sp>
@@ -3423,6 +3419,7 @@
           <a:p>
             <a:fld id="{4509A250-FF31-4206-8172-F9D3106AACB1}" type="datetimeFigureOut">
               <a:rPr lang="en-US" dirty="0"/>
+              <a:t>5/20/2020</a:t>
             </a:fld>
             <a:endParaRPr lang="en-US" dirty="0"/>
           </a:p>
@@ -3464,6 +3461,7 @@
           <a:p>
             <a:fld id="{D57F1E4F-1CFF-5643-939E-02111984F565}" type="slidenum">
               <a:rPr lang="en-US" dirty="0"/>
+              <a:t>‹#›</a:t>
             </a:fld>
             <a:endParaRPr lang="en-US" dirty="0"/>
           </a:p>
@@ -3513,7 +3511,6 @@
               <a:rPr lang="en-US" dirty="0"/>
               <a:t>Click to edit Master title style</a:t>
             </a:r>
-            <a:endParaRPr lang="en-US" dirty="0"/>
           </a:p>
         </p:txBody>
       </p:sp>
@@ -3537,7 +3534,6 @@
               <a:rPr lang="en-US" dirty="0"/>
               <a:t>Click to edit Master text styles</a:t>
             </a:r>
-            <a:endParaRPr lang="en-US" dirty="0"/>
           </a:p>
           <a:p>
             <a:pPr lvl="1"/>
@@ -3545,7 +3541,6 @@
               <a:rPr lang="en-US" dirty="0"/>
               <a:t>Second level</a:t>
             </a:r>
-            <a:endParaRPr lang="en-US" dirty="0"/>
           </a:p>
           <a:p>
             <a:pPr lvl="2"/>
@@ -3553,7 +3548,6 @@
               <a:rPr lang="en-US" dirty="0"/>
               <a:t>Third level</a:t>
             </a:r>
-            <a:endParaRPr lang="en-US" dirty="0"/>
           </a:p>
           <a:p>
             <a:pPr lvl="3"/>
@@ -3561,7 +3555,6 @@
               <a:rPr lang="en-US" dirty="0"/>
               <a:t>Fourth level</a:t>
             </a:r>
-            <a:endParaRPr lang="en-US" dirty="0"/>
           </a:p>
           <a:p>
             <a:pPr lvl="4"/>
@@ -3569,7 +3562,6 @@
               <a:rPr lang="en-US" dirty="0"/>
               <a:t>Fifth level</a:t>
             </a:r>
-            <a:endParaRPr lang="en-US" dirty="0"/>
           </a:p>
         </p:txBody>
       </p:sp>
@@ -3590,6 +3582,7 @@
           <a:p>
             <a:fld id="{4509A250-FF31-4206-8172-F9D3106AACB1}" type="datetimeFigureOut">
               <a:rPr lang="en-US" dirty="0"/>
+              <a:t>5/20/2020</a:t>
             </a:fld>
             <a:endParaRPr lang="en-US" dirty="0"/>
           </a:p>
@@ -3631,6 +3624,7 @@
           <a:p>
             <a:fld id="{D57F1E4F-1CFF-5643-939E-02111984F565}" type="slidenum">
               <a:rPr lang="en-US" dirty="0"/>
+              <a:t>‹#›</a:t>
             </a:fld>
             <a:endParaRPr lang="en-US" dirty="0"/>
           </a:p>
@@ -3685,7 +3679,6 @@
               <a:rPr lang="en-US" dirty="0"/>
               <a:t>Click to edit Master title style</a:t>
             </a:r>
-            <a:endParaRPr lang="en-US" dirty="0"/>
           </a:p>
         </p:txBody>
       </p:sp>
@@ -3714,7 +3707,6 @@
               <a:rPr lang="en-US" dirty="0"/>
               <a:t>Click to edit Master text styles</a:t>
             </a:r>
-            <a:endParaRPr lang="en-US" dirty="0"/>
           </a:p>
           <a:p>
             <a:pPr lvl="1"/>
@@ -3722,7 +3714,6 @@
               <a:rPr lang="en-US" dirty="0"/>
               <a:t>Second level</a:t>
             </a:r>
-            <a:endParaRPr lang="en-US" dirty="0"/>
           </a:p>
           <a:p>
             <a:pPr lvl="2"/>
@@ -3730,7 +3721,6 @@
               <a:rPr lang="en-US" dirty="0"/>
               <a:t>Third level</a:t>
             </a:r>
-            <a:endParaRPr lang="en-US" dirty="0"/>
           </a:p>
           <a:p>
             <a:pPr lvl="3"/>
@@ -3738,7 +3728,6 @@
               <a:rPr lang="en-US" dirty="0"/>
               <a:t>Fourth level</a:t>
             </a:r>
-            <a:endParaRPr lang="en-US" dirty="0"/>
           </a:p>
           <a:p>
             <a:pPr lvl="4"/>
@@ -3746,7 +3735,6 @@
               <a:rPr lang="en-US" dirty="0"/>
               <a:t>Fifth level</a:t>
             </a:r>
-            <a:endParaRPr lang="en-US" dirty="0"/>
           </a:p>
         </p:txBody>
       </p:sp>
@@ -3767,6 +3755,7 @@
           <a:p>
             <a:fld id="{4509A250-FF31-4206-8172-F9D3106AACB1}" type="datetimeFigureOut">
               <a:rPr lang="en-US" dirty="0"/>
+              <a:t>5/20/2020</a:t>
             </a:fld>
             <a:endParaRPr lang="en-US" dirty="0"/>
           </a:p>
@@ -3808,6 +3797,7 @@
           <a:p>
             <a:fld id="{D57F1E4F-1CFF-5643-939E-02111984F565}" type="slidenum">
               <a:rPr lang="en-US" dirty="0"/>
+              <a:t>‹#›</a:t>
             </a:fld>
             <a:endParaRPr lang="en-US" dirty="0"/>
           </a:p>
@@ -3857,7 +3847,6 @@
               <a:rPr lang="en-US" dirty="0"/>
               <a:t>Click to edit Master title style</a:t>
             </a:r>
-            <a:endParaRPr lang="en-US" dirty="0"/>
           </a:p>
         </p:txBody>
       </p:sp>
@@ -3881,7 +3870,6 @@
               <a:rPr lang="en-US" dirty="0"/>
               <a:t>Click to edit Master text styles</a:t>
             </a:r>
-            <a:endParaRPr lang="en-US" dirty="0"/>
           </a:p>
           <a:p>
             <a:pPr lvl="1"/>
@@ -3889,7 +3877,6 @@
               <a:rPr lang="en-US" dirty="0"/>
               <a:t>Second level</a:t>
             </a:r>
-            <a:endParaRPr lang="en-US" dirty="0"/>
           </a:p>
           <a:p>
             <a:pPr lvl="2"/>
@@ -3897,7 +3884,6 @@
               <a:rPr lang="en-US" dirty="0"/>
               <a:t>Third level</a:t>
             </a:r>
-            <a:endParaRPr lang="en-US" dirty="0"/>
           </a:p>
           <a:p>
             <a:pPr lvl="3"/>
@@ -3905,7 +3891,6 @@
               <a:rPr lang="en-US" dirty="0"/>
               <a:t>Fourth level</a:t>
             </a:r>
-            <a:endParaRPr lang="en-US" dirty="0"/>
           </a:p>
           <a:p>
             <a:pPr lvl="4"/>
@@ -3913,7 +3898,6 @@
               <a:rPr lang="en-US" dirty="0"/>
               <a:t>Fifth level</a:t>
             </a:r>
-            <a:endParaRPr lang="en-US" dirty="0"/>
           </a:p>
         </p:txBody>
       </p:sp>
@@ -3934,6 +3918,7 @@
           <a:p>
             <a:fld id="{4509A250-FF31-4206-8172-F9D3106AACB1}" type="datetimeFigureOut">
               <a:rPr lang="en-US" dirty="0"/>
+              <a:t>5/20/2020</a:t>
             </a:fld>
             <a:endParaRPr lang="en-US" dirty="0"/>
           </a:p>
@@ -3975,6 +3960,7 @@
           <a:p>
             <a:fld id="{D57F1E4F-1CFF-5643-939E-02111984F565}" type="slidenum">
               <a:rPr lang="en-US" dirty="0"/>
+              <a:t>‹#›</a:t>
             </a:fld>
             <a:endParaRPr lang="en-US" dirty="0"/>
           </a:p>
@@ -4033,7 +4019,6 @@
               <a:rPr lang="en-US" dirty="0"/>
               <a:t>Click to edit Master title style</a:t>
             </a:r>
-            <a:endParaRPr lang="en-US" dirty="0"/>
           </a:p>
         </p:txBody>
       </p:sp>
@@ -4154,7 +4139,6 @@
               <a:rPr lang="en-US" dirty="0"/>
               <a:t>Click to edit Master text styles</a:t>
             </a:r>
-            <a:endParaRPr lang="en-US" dirty="0"/>
           </a:p>
         </p:txBody>
       </p:sp>
@@ -4175,6 +4159,7 @@
           <a:p>
             <a:fld id="{9796027F-7875-4030-9381-8BD8C4F21935}" type="datetimeFigureOut">
               <a:rPr lang="en-US" dirty="0"/>
+              <a:t>5/20/2020</a:t>
             </a:fld>
             <a:endParaRPr lang="en-US" dirty="0"/>
           </a:p>
@@ -4216,6 +4201,7 @@
           <a:p>
             <a:fld id="{D57F1E4F-1CFF-5643-939E-02111984F565}" type="slidenum">
               <a:rPr lang="en-US" dirty="0"/>
+              <a:t>‹#›</a:t>
             </a:fld>
             <a:endParaRPr lang="en-US" dirty="0"/>
           </a:p>
@@ -4265,7 +4251,6 @@
               <a:rPr lang="en-US" dirty="0"/>
               <a:t>Click to edit Master title style</a:t>
             </a:r>
-            <a:endParaRPr lang="en-US" dirty="0"/>
           </a:p>
         </p:txBody>
       </p:sp>
@@ -4324,7 +4309,6 @@
               <a:rPr lang="en-US" dirty="0"/>
               <a:t>Click to edit Master text styles</a:t>
             </a:r>
-            <a:endParaRPr lang="en-US" dirty="0"/>
           </a:p>
           <a:p>
             <a:pPr lvl="1"/>
@@ -4332,7 +4316,6 @@
               <a:rPr lang="en-US" dirty="0"/>
               <a:t>Second level</a:t>
             </a:r>
-            <a:endParaRPr lang="en-US" dirty="0"/>
           </a:p>
           <a:p>
             <a:pPr lvl="2"/>
@@ -4340,7 +4323,6 @@
               <a:rPr lang="en-US" dirty="0"/>
               <a:t>Third level</a:t>
             </a:r>
-            <a:endParaRPr lang="en-US" dirty="0"/>
           </a:p>
           <a:p>
             <a:pPr lvl="3"/>
@@ -4348,7 +4330,6 @@
               <a:rPr lang="en-US" dirty="0"/>
               <a:t>Fourth level</a:t>
             </a:r>
-            <a:endParaRPr lang="en-US" dirty="0"/>
           </a:p>
           <a:p>
             <a:pPr lvl="4"/>
@@ -4356,7 +4337,6 @@
               <a:rPr lang="en-US" dirty="0"/>
               <a:t>Fifth level</a:t>
             </a:r>
-            <a:endParaRPr lang="en-US" dirty="0"/>
           </a:p>
         </p:txBody>
       </p:sp>
@@ -4415,7 +4395,6 @@
               <a:rPr lang="en-US" dirty="0"/>
               <a:t>Click to edit Master text styles</a:t>
             </a:r>
-            <a:endParaRPr lang="en-US" dirty="0"/>
           </a:p>
           <a:p>
             <a:pPr lvl="1"/>
@@ -4423,7 +4402,6 @@
               <a:rPr lang="en-US" dirty="0"/>
               <a:t>Second level</a:t>
             </a:r>
-            <a:endParaRPr lang="en-US" dirty="0"/>
           </a:p>
           <a:p>
             <a:pPr lvl="2"/>
@@ -4431,7 +4409,6 @@
               <a:rPr lang="en-US" dirty="0"/>
               <a:t>Third level</a:t>
             </a:r>
-            <a:endParaRPr lang="en-US" dirty="0"/>
           </a:p>
           <a:p>
             <a:pPr lvl="3"/>
@@ -4439,7 +4416,6 @@
               <a:rPr lang="en-US" dirty="0"/>
               <a:t>Fourth level</a:t>
             </a:r>
-            <a:endParaRPr lang="en-US" dirty="0"/>
           </a:p>
           <a:p>
             <a:pPr lvl="4"/>
@@ -4447,7 +4423,6 @@
               <a:rPr lang="en-US" dirty="0"/>
               <a:t>Fifth level</a:t>
             </a:r>
-            <a:endParaRPr lang="en-US" dirty="0"/>
           </a:p>
         </p:txBody>
       </p:sp>
@@ -4468,6 +4443,7 @@
           <a:p>
             <a:fld id="{9796027F-7875-4030-9381-8BD8C4F21935}" type="datetimeFigureOut">
               <a:rPr lang="en-US" dirty="0"/>
+              <a:t>5/20/2020</a:t>
             </a:fld>
             <a:endParaRPr lang="en-US" dirty="0"/>
           </a:p>
@@ -4509,6 +4485,7 @@
           <a:p>
             <a:fld id="{D57F1E4F-1CFF-5643-939E-02111984F565}" type="slidenum">
               <a:rPr lang="en-US" dirty="0"/>
+              <a:t>‹#›</a:t>
             </a:fld>
             <a:endParaRPr lang="en-US" dirty="0"/>
           </a:p>
@@ -4562,7 +4539,6 @@
               <a:rPr lang="en-US" dirty="0"/>
               <a:t>Click to edit Master title style</a:t>
             </a:r>
-            <a:endParaRPr lang="en-US" dirty="0"/>
           </a:p>
         </p:txBody>
       </p:sp>
@@ -4637,7 +4613,6 @@
               <a:rPr lang="en-US" dirty="0"/>
               <a:t>Click to edit Master text styles</a:t>
             </a:r>
-            <a:endParaRPr lang="en-US" dirty="0"/>
           </a:p>
         </p:txBody>
       </p:sp>
@@ -4696,7 +4671,6 @@
               <a:rPr lang="en-US" dirty="0"/>
               <a:t>Click to edit Master text styles</a:t>
             </a:r>
-            <a:endParaRPr lang="en-US" dirty="0"/>
           </a:p>
           <a:p>
             <a:pPr lvl="1"/>
@@ -4704,7 +4678,6 @@
               <a:rPr lang="en-US" dirty="0"/>
               <a:t>Second level</a:t>
             </a:r>
-            <a:endParaRPr lang="en-US" dirty="0"/>
           </a:p>
           <a:p>
             <a:pPr lvl="2"/>
@@ -4712,7 +4685,6 @@
               <a:rPr lang="en-US" dirty="0"/>
               <a:t>Third level</a:t>
             </a:r>
-            <a:endParaRPr lang="en-US" dirty="0"/>
           </a:p>
           <a:p>
             <a:pPr lvl="3"/>
@@ -4720,7 +4692,6 @@
               <a:rPr lang="en-US" dirty="0"/>
               <a:t>Fourth level</a:t>
             </a:r>
-            <a:endParaRPr lang="en-US" dirty="0"/>
           </a:p>
           <a:p>
             <a:pPr lvl="4"/>
@@ -4728,7 +4699,6 @@
               <a:rPr lang="en-US" dirty="0"/>
               <a:t>Fifth level</a:t>
             </a:r>
-            <a:endParaRPr lang="en-US" dirty="0"/>
           </a:p>
         </p:txBody>
       </p:sp>
@@ -4803,7 +4773,6 @@
               <a:rPr lang="en-US" dirty="0"/>
               <a:t>Click to edit Master text styles</a:t>
             </a:r>
-            <a:endParaRPr lang="en-US" dirty="0"/>
           </a:p>
         </p:txBody>
       </p:sp>
@@ -4862,7 +4831,6 @@
               <a:rPr lang="en-US" dirty="0"/>
               <a:t>Click to edit Master text styles</a:t>
             </a:r>
-            <a:endParaRPr lang="en-US" dirty="0"/>
           </a:p>
           <a:p>
             <a:pPr lvl="1"/>
@@ -4870,7 +4838,6 @@
               <a:rPr lang="en-US" dirty="0"/>
               <a:t>Second level</a:t>
             </a:r>
-            <a:endParaRPr lang="en-US" dirty="0"/>
           </a:p>
           <a:p>
             <a:pPr lvl="2"/>
@@ -4878,7 +4845,6 @@
               <a:rPr lang="en-US" dirty="0"/>
               <a:t>Third level</a:t>
             </a:r>
-            <a:endParaRPr lang="en-US" dirty="0"/>
           </a:p>
           <a:p>
             <a:pPr lvl="3"/>
@@ -4886,7 +4852,6 @@
               <a:rPr lang="en-US" dirty="0"/>
               <a:t>Fourth level</a:t>
             </a:r>
-            <a:endParaRPr lang="en-US" dirty="0"/>
           </a:p>
           <a:p>
             <a:pPr lvl="4"/>
@@ -4894,7 +4859,6 @@
               <a:rPr lang="en-US" dirty="0"/>
               <a:t>Fifth level</a:t>
             </a:r>
-            <a:endParaRPr lang="en-US" dirty="0"/>
           </a:p>
         </p:txBody>
       </p:sp>
@@ -4915,6 +4879,7 @@
           <a:p>
             <a:fld id="{9796027F-7875-4030-9381-8BD8C4F21935}" type="datetimeFigureOut">
               <a:rPr lang="en-US" dirty="0"/>
+              <a:t>5/20/2020</a:t>
             </a:fld>
             <a:endParaRPr lang="en-US" dirty="0"/>
           </a:p>
@@ -4956,6 +4921,7 @@
           <a:p>
             <a:fld id="{D57F1E4F-1CFF-5643-939E-02111984F565}" type="slidenum">
               <a:rPr lang="en-US" dirty="0"/>
+              <a:t>‹#›</a:t>
             </a:fld>
             <a:endParaRPr lang="en-US" dirty="0"/>
           </a:p>
@@ -5005,7 +4971,6 @@
               <a:rPr lang="en-US" dirty="0"/>
               <a:t>Click to edit Master title style</a:t>
             </a:r>
-            <a:endParaRPr lang="en-US" dirty="0"/>
           </a:p>
         </p:txBody>
       </p:sp>
@@ -5026,6 +4991,7 @@
           <a:p>
             <a:fld id="{4509A250-FF31-4206-8172-F9D3106AACB1}" type="datetimeFigureOut">
               <a:rPr lang="en-US" dirty="0"/>
+              <a:t>5/20/2020</a:t>
             </a:fld>
             <a:endParaRPr lang="en-US" dirty="0"/>
           </a:p>
@@ -5067,6 +5033,7 @@
           <a:p>
             <a:fld id="{D57F1E4F-1CFF-5643-939E-02111984F565}" type="slidenum">
               <a:rPr lang="en-US" dirty="0"/>
+              <a:t>‹#›</a:t>
             </a:fld>
             <a:endParaRPr lang="en-US" dirty="0"/>
           </a:p>
@@ -5114,6 +5081,7 @@
           <a:p>
             <a:fld id="{4509A250-FF31-4206-8172-F9D3106AACB1}" type="datetimeFigureOut">
               <a:rPr lang="en-US" dirty="0"/>
+              <a:t>5/20/2020</a:t>
             </a:fld>
             <a:endParaRPr lang="en-US" dirty="0"/>
           </a:p>
@@ -5155,6 +5123,7 @@
           <a:p>
             <a:fld id="{D57F1E4F-1CFF-5643-939E-02111984F565}" type="slidenum">
               <a:rPr lang="en-US" dirty="0"/>
+              <a:t>‹#›</a:t>
             </a:fld>
             <a:endParaRPr lang="en-US" dirty="0"/>
           </a:p>
@@ -5213,7 +5182,6 @@
               <a:rPr lang="en-US" dirty="0"/>
               <a:t>Click to edit Master title style</a:t>
             </a:r>
-            <a:endParaRPr lang="en-US" dirty="0"/>
           </a:p>
         </p:txBody>
       </p:sp>
@@ -5272,7 +5240,6 @@
               <a:rPr lang="en-US" dirty="0"/>
               <a:t>Click to edit Master text styles</a:t>
             </a:r>
-            <a:endParaRPr lang="en-US" dirty="0"/>
           </a:p>
           <a:p>
             <a:pPr lvl="1"/>
@@ -5280,7 +5247,6 @@
               <a:rPr lang="en-US" dirty="0"/>
               <a:t>Second level</a:t>
             </a:r>
-            <a:endParaRPr lang="en-US" dirty="0"/>
           </a:p>
           <a:p>
             <a:pPr lvl="2"/>
@@ -5288,7 +5254,6 @@
               <a:rPr lang="en-US" dirty="0"/>
               <a:t>Third level</a:t>
             </a:r>
-            <a:endParaRPr lang="en-US" dirty="0"/>
           </a:p>
           <a:p>
             <a:pPr lvl="3"/>
@@ -5296,7 +5261,6 @@
               <a:rPr lang="en-US" dirty="0"/>
               <a:t>Fourth level</a:t>
             </a:r>
-            <a:endParaRPr lang="en-US" dirty="0"/>
           </a:p>
           <a:p>
             <a:pPr lvl="4"/>
@@ -5304,7 +5268,6 @@
               <a:rPr lang="en-US" dirty="0"/>
               <a:t>Fifth level</a:t>
             </a:r>
-            <a:endParaRPr lang="en-US" dirty="0"/>
           </a:p>
         </p:txBody>
       </p:sp>
@@ -5370,7 +5333,6 @@
               <a:rPr lang="en-US" dirty="0"/>
               <a:t>Click to edit Master text styles</a:t>
             </a:r>
-            <a:endParaRPr lang="en-US" dirty="0"/>
           </a:p>
         </p:txBody>
       </p:sp>
@@ -5391,6 +5353,7 @@
           <a:p>
             <a:fld id="{4509A250-FF31-4206-8172-F9D3106AACB1}" type="datetimeFigureOut">
               <a:rPr lang="en-US" dirty="0"/>
+              <a:t>5/20/2020</a:t>
             </a:fld>
             <a:endParaRPr lang="en-US" dirty="0"/>
           </a:p>
@@ -5432,6 +5395,7 @@
           <a:p>
             <a:fld id="{D57F1E4F-1CFF-5643-939E-02111984F565}" type="slidenum">
               <a:rPr lang="en-US" dirty="0"/>
+              <a:t>‹#›</a:t>
             </a:fld>
             <a:endParaRPr lang="en-US" dirty="0"/>
           </a:p>
@@ -5492,7 +5456,6 @@
               <a:rPr lang="en-US" dirty="0"/>
               <a:t>Click to edit Master title style</a:t>
             </a:r>
-            <a:endParaRPr lang="en-US" dirty="0"/>
           </a:p>
         </p:txBody>
       </p:sp>
@@ -5635,7 +5598,6 @@
               <a:rPr lang="en-US" dirty="0"/>
               <a:t>Click to edit Master text styles</a:t>
             </a:r>
-            <a:endParaRPr lang="en-US" dirty="0"/>
           </a:p>
         </p:txBody>
       </p:sp>
@@ -5656,6 +5618,7 @@
           <a:p>
             <a:fld id="{4509A250-FF31-4206-8172-F9D3106AACB1}" type="datetimeFigureOut">
               <a:rPr lang="en-US" dirty="0"/>
+              <a:t>5/20/2020</a:t>
             </a:fld>
             <a:endParaRPr lang="en-US" dirty="0"/>
           </a:p>
@@ -5697,6 +5660,7 @@
           <a:p>
             <a:fld id="{D57F1E4F-1CFF-5643-939E-02111984F565}" type="slidenum">
               <a:rPr lang="en-US" dirty="0"/>
+              <a:t>‹#›</a:t>
             </a:fld>
             <a:endParaRPr lang="en-US" dirty="0"/>
           </a:p>
@@ -5741,7 +5705,7 @@
           <p:nvPr/>
         </p:nvPicPr>
         <p:blipFill rotWithShape="1">
-          <a:blip r:embed="rId18">
+          <a:blip r:embed="rId19">
             <a:extLst>
               <a:ext uri="{28A0092B-C50C-407E-A947-70E740481C1C}">
                 <a14:useLocalDpi xmlns:a14="http://schemas.microsoft.com/office/drawing/2010/main" val="0"/>
@@ -5772,7 +5736,7 @@
           <p:nvPr/>
         </p:nvPicPr>
         <p:blipFill rotWithShape="1">
-          <a:blip r:embed="rId19">
+          <a:blip r:embed="rId20">
             <a:extLst>
               <a:ext uri="{28A0092B-C50C-407E-A947-70E740481C1C}">
                 <a14:useLocalDpi xmlns:a14="http://schemas.microsoft.com/office/drawing/2010/main" val="0"/>
@@ -5866,7 +5830,7 @@
           <p:nvPr/>
         </p:nvPicPr>
         <p:blipFill rotWithShape="1">
-          <a:blip r:embed="rId20">
+          <a:blip r:embed="rId21">
             <a:extLst>
               <a:ext uri="{28A0092B-C50C-407E-A947-70E740481C1C}">
                 <a14:useLocalDpi xmlns:a14="http://schemas.microsoft.com/office/drawing/2010/main" val="0"/>
@@ -5897,7 +5861,7 @@
           <p:nvPr/>
         </p:nvPicPr>
         <p:blipFill rotWithShape="1">
-          <a:blip r:embed="rId21">
+          <a:blip r:embed="rId22">
             <a:extLst>
               <a:ext uri="{28A0092B-C50C-407E-A947-70E740481C1C}">
                 <a14:useLocalDpi xmlns:a14="http://schemas.microsoft.com/office/drawing/2010/main" val="0"/>
@@ -5984,7 +5948,6 @@
               <a:rPr lang="en-US" dirty="0"/>
               <a:t>Click to edit Master title style</a:t>
             </a:r>
-            <a:endParaRPr lang="en-US" dirty="0"/>
           </a:p>
         </p:txBody>
       </p:sp>
@@ -6018,7 +5981,6 @@
               <a:rPr lang="en-US" dirty="0"/>
               <a:t>Click to edit Master text styles</a:t>
             </a:r>
-            <a:endParaRPr lang="en-US" dirty="0"/>
           </a:p>
           <a:p>
             <a:pPr lvl="1"/>
@@ -6026,7 +5988,6 @@
               <a:rPr lang="en-US" dirty="0"/>
               <a:t>Second level</a:t>
             </a:r>
-            <a:endParaRPr lang="en-US" dirty="0"/>
           </a:p>
           <a:p>
             <a:pPr lvl="2"/>
@@ -6034,7 +5995,6 @@
               <a:rPr lang="en-US" dirty="0"/>
               <a:t>Third level</a:t>
             </a:r>
-            <a:endParaRPr lang="en-US" dirty="0"/>
           </a:p>
           <a:p>
             <a:pPr lvl="3"/>
@@ -6042,7 +6002,6 @@
               <a:rPr lang="en-US" dirty="0"/>
               <a:t>Fourth level</a:t>
             </a:r>
-            <a:endParaRPr lang="en-US" dirty="0"/>
           </a:p>
           <a:p>
             <a:pPr lvl="4"/>
@@ -6050,7 +6009,6 @@
               <a:rPr lang="en-US" dirty="0"/>
               <a:t>Fifth level</a:t>
             </a:r>
-            <a:endParaRPr lang="en-US" dirty="0"/>
           </a:p>
         </p:txBody>
       </p:sp>
@@ -6090,6 +6048,7 @@
           <a:p>
             <a:fld id="{4AAD347D-5ACD-4C99-B74B-A9C85AD731AF}" type="datetimeFigureOut">
               <a:rPr lang="en-US" dirty="0"/>
+              <a:t>5/20/2020</a:t>
             </a:fld>
             <a:endParaRPr lang="en-US" dirty="0"/>
           </a:p>
@@ -6168,6 +6127,7 @@
           <a:p>
             <a:fld id="{D57F1E4F-1CFF-5643-939E-02111984F565}" type="slidenum">
               <a:rPr lang="en-US" dirty="0"/>
+              <a:t>‹#›</a:t>
             </a:fld>
             <a:endParaRPr lang="en-US" dirty="0"/>
           </a:p>
@@ -6638,9 +6598,6 @@
               </a:rPr>
               <a:t>Chat App</a:t>
             </a:r>
-            <a:endParaRPr lang="en-US">
-              <a:cs typeface="Calibri Light" panose="020F0302020204030204"/>
-            </a:endParaRPr>
           </a:p>
         </p:txBody>
       </p:sp>
@@ -6678,9 +6635,6 @@
               </a:rPr>
               <a:t> 5 : </a:t>
             </a:r>
-            <a:endParaRPr lang="en-US" b="1">
-              <a:cs typeface="Calibri" panose="020F0502020204030204"/>
-            </a:endParaRPr>
           </a:p>
           <a:p>
             <a:r>
@@ -6891,54 +6845,77 @@
           <a:lstStyle/>
           <a:p>
             <a:r>
-              <a:rPr lang="en-US" err="1"/>
+              <a:rPr lang="en-US" dirty="0" err="1"/>
               <a:t>Aplikasi</a:t>
             </a:r>
             <a:r>
-              <a:rPr lang="en-US"/>
+              <a:rPr lang="en-US" dirty="0"/>
               <a:t> yang kami </a:t>
             </a:r>
             <a:r>
-              <a:rPr lang="en-US" err="1"/>
+              <a:rPr lang="en-US" dirty="0" err="1"/>
               <a:t>buat</a:t>
             </a:r>
             <a:r>
-              <a:rPr lang="en-US"/>
+              <a:rPr lang="en-US" dirty="0"/>
               <a:t> </a:t>
             </a:r>
             <a:r>
-              <a:rPr lang="en-US" err="1"/>
+              <a:rPr lang="en-US" dirty="0" err="1"/>
               <a:t>menggunakan</a:t>
             </a:r>
             <a:r>
-              <a:rPr lang="en-US"/>
-              <a:t> http-server dan socket </a:t>
-            </a:r>
-            <a:r>
-              <a:rPr lang="en-US" err="1"/>
+              <a:rPr lang="en-US" dirty="0"/>
+              <a:t> ftp-server dan socket </a:t>
+            </a:r>
+            <a:r>
+              <a:rPr lang="en-US" dirty="0" err="1"/>
               <a:t>untuk</a:t>
             </a:r>
             <a:r>
-              <a:rPr lang="en-US"/>
+              <a:rPr lang="en-US" dirty="0"/>
               <a:t> </a:t>
             </a:r>
             <a:r>
-              <a:rPr lang="en-US" err="1"/>
+              <a:rPr lang="en-US" dirty="0" err="1"/>
               <a:t>transaksi</a:t>
             </a:r>
             <a:r>
-              <a:rPr lang="en-US"/>
+              <a:rPr lang="en-US" dirty="0"/>
               <a:t> data. </a:t>
             </a:r>
             <a:r>
-              <a:rPr lang="en-US" err="1"/>
-              <a:t>Aplikasi ini merupakan aplikasi desktop.</a:t>
-            </a:r>
-            <a:r>
-              <a:rPr lang="en-US"/>
-              <a:t> </a:t>
-            </a:r>
-            <a:endParaRPr lang="en-US"/>
+              <a:rPr lang="en-US" dirty="0" err="1"/>
+              <a:t>Aplikasi</a:t>
+            </a:r>
+            <a:r>
+              <a:rPr lang="en-US" dirty="0"/>
+              <a:t> </a:t>
+            </a:r>
+            <a:r>
+              <a:rPr lang="en-US" dirty="0" err="1"/>
+              <a:t>ini</a:t>
+            </a:r>
+            <a:r>
+              <a:rPr lang="en-US" dirty="0"/>
+              <a:t> </a:t>
+            </a:r>
+            <a:r>
+              <a:rPr lang="en-US" dirty="0" err="1"/>
+              <a:t>merupakan</a:t>
+            </a:r>
+            <a:r>
+              <a:rPr lang="en-US" dirty="0"/>
+              <a:t> </a:t>
+            </a:r>
+            <a:r>
+              <a:rPr lang="en-US" dirty="0" err="1"/>
+              <a:t>aplikasi</a:t>
+            </a:r>
+            <a:r>
+              <a:rPr lang="en-US" dirty="0"/>
+              <a:t> desktop. </a:t>
+            </a:r>
           </a:p>
         </p:txBody>
       </p:sp>
@@ -7159,9 +7136,6 @@
               </a:rPr>
               <a:t>file.</a:t>
             </a:r>
-            <a:endParaRPr lang="en-US">
-              <a:cs typeface="Calibri" panose="020F0502020204030204"/>
-            </a:endParaRPr>
           </a:p>
           <a:p>
             <a:r>
@@ -7193,7 +7167,7 @@
           <p:nvPr/>
         </p:nvPicPr>
         <p:blipFill>
-          <a:blip r:embed="rId1"/>
+          <a:blip r:embed="rId2"/>
           <a:stretch>
             <a:fillRect/>
           </a:stretch>
@@ -7325,194 +7299,318 @@
           <a:lstStyle/>
           <a:p>
             <a:r>
-              <a:rPr lang="en-US">
+              <a:rPr lang="en-US" dirty="0">
                 <a:ea typeface="+mn-lt"/>
                 <a:cs typeface="+mn-lt"/>
               </a:rPr>
-              <a:t>HTTP server, Socket, Thread, Chat</a:t>
-            </a:r>
-            <a:endParaRPr lang="en-US">
+              <a:t>Socket, Thread, Chat, threading, select, TCP</a:t>
+            </a:r>
+            <a:endParaRPr lang="en-US" dirty="0">
               <a:ea typeface="+mn-lt"/>
               <a:cs typeface="Calibri" panose="020F0502020204030204"/>
             </a:endParaRPr>
           </a:p>
           <a:p>
             <a:r>
-              <a:rPr lang="en-US" err="1">
+              <a:rPr lang="en-US" dirty="0">
                 <a:ea typeface="+mn-lt"/>
                 <a:cs typeface="+mn-lt"/>
               </a:rPr>
-              <a:t>Fitur</a:t>
-            </a:r>
-            <a:r>
-              <a:rPr lang="en-US">
+              <a:t>Socket - </a:t>
+            </a:r>
+            <a:r>
+              <a:rPr lang="en-US" dirty="0" err="1">
                 <a:ea typeface="+mn-lt"/>
                 <a:cs typeface="+mn-lt"/>
               </a:rPr>
-              <a:t> chat – </a:t>
-            </a:r>
-            <a:r>
-              <a:rPr lang="en-US" err="1">
+              <a:t>buat</a:t>
+            </a:r>
+            <a:r>
+              <a:rPr lang="en-US" dirty="0">
                 <a:ea typeface="+mn-lt"/>
                 <a:cs typeface="+mn-lt"/>
               </a:rPr>
-              <a:t>untuk</a:t>
-            </a:r>
-            <a:r>
-              <a:rPr lang="en-US">
+              <a:t> </a:t>
+            </a:r>
+            <a:r>
+              <a:rPr lang="en-US" dirty="0" err="1">
                 <a:ea typeface="+mn-lt"/>
                 <a:cs typeface="+mn-lt"/>
               </a:rPr>
-              <a:t> </a:t>
-            </a:r>
-            <a:r>
-              <a:rPr lang="en-US" err="1">
+              <a:t>transisi</a:t>
+            </a:r>
+            <a:r>
+              <a:rPr lang="en-US" dirty="0">
                 <a:ea typeface="+mn-lt"/>
                 <a:cs typeface="+mn-lt"/>
               </a:rPr>
-              <a:t>saling</a:t>
-            </a:r>
-            <a:r>
-              <a:rPr lang="en-US">
+              <a:t> data client-server</a:t>
+            </a:r>
+            <a:endParaRPr lang="en-US" dirty="0"/>
+          </a:p>
+          <a:p>
+            <a:r>
+              <a:rPr lang="en-US" dirty="0">
                 <a:ea typeface="+mn-lt"/>
                 <a:cs typeface="+mn-lt"/>
               </a:rPr>
-              <a:t> </a:t>
-            </a:r>
-            <a:r>
-              <a:rPr lang="en-US" err="1">
+              <a:t>Thread - agar </a:t>
+            </a:r>
+            <a:r>
+              <a:rPr lang="en-US" dirty="0" err="1">
                 <a:ea typeface="+mn-lt"/>
                 <a:cs typeface="+mn-lt"/>
               </a:rPr>
-              <a:t>bertukar</a:t>
-            </a:r>
-            <a:r>
-              <a:rPr lang="en-US">
+              <a:t>bisa</a:t>
+            </a:r>
+            <a:r>
+              <a:rPr lang="en-US" dirty="0">
                 <a:ea typeface="+mn-lt"/>
                 <a:cs typeface="+mn-lt"/>
               </a:rPr>
               <a:t> </a:t>
             </a:r>
             <a:r>
-              <a:rPr lang="en-US" err="1">
+              <a:rPr lang="en-US" dirty="0" err="1">
                 <a:ea typeface="+mn-lt"/>
                 <a:cs typeface="+mn-lt"/>
               </a:rPr>
-              <a:t>pesan</a:t>
-            </a:r>
-            <a:endParaRPr lang="en-US" err="1">
-              <a:cs typeface="Calibri" panose="020F0502020204030204"/>
-            </a:endParaRPr>
-          </a:p>
-          <a:p>
-            <a:r>
-              <a:rPr lang="en-US">
+              <a:t>menjalankan</a:t>
+            </a:r>
+            <a:r>
+              <a:rPr lang="en-US" dirty="0">
                 <a:ea typeface="+mn-lt"/>
                 <a:cs typeface="+mn-lt"/>
               </a:rPr>
-              <a:t>Select - untuk menangani banyak client dalam satu waktu</a:t>
-            </a:r>
-            <a:endParaRPr lang="en-US">
+              <a:t> proses </a:t>
+            </a:r>
+            <a:r>
+              <a:rPr lang="en-US" dirty="0" err="1">
+                <a:ea typeface="+mn-lt"/>
+                <a:cs typeface="+mn-lt"/>
+              </a:rPr>
+              <a:t>secara</a:t>
+            </a:r>
+            <a:r>
+              <a:rPr lang="en-US" dirty="0">
+                <a:ea typeface="+mn-lt"/>
+                <a:cs typeface="+mn-lt"/>
+              </a:rPr>
+              <a:t> </a:t>
+            </a:r>
+            <a:r>
+              <a:rPr lang="en-US" dirty="0" err="1">
+                <a:ea typeface="+mn-lt"/>
+                <a:cs typeface="+mn-lt"/>
+              </a:rPr>
+              <a:t>bersamaan</a:t>
+            </a:r>
+            <a:endParaRPr lang="en-US" dirty="0">
               <a:ea typeface="+mn-lt"/>
               <a:cs typeface="+mn-lt"/>
             </a:endParaRPr>
           </a:p>
           <a:p>
             <a:r>
-              <a:rPr lang="en-US">
+              <a:rPr lang="en-US" dirty="0">
                 <a:ea typeface="+mn-lt"/>
                 <a:cs typeface="+mn-lt"/>
               </a:rPr>
-              <a:t>Socket - </a:t>
-            </a:r>
-            <a:r>
-              <a:rPr lang="en-US" err="1">
+              <a:t>Fitur chat – </a:t>
+            </a:r>
+            <a:r>
+              <a:rPr lang="en-US" dirty="0" err="1">
                 <a:ea typeface="+mn-lt"/>
                 <a:cs typeface="+mn-lt"/>
               </a:rPr>
-              <a:t>buat</a:t>
-            </a:r>
-            <a:r>
-              <a:rPr lang="en-US">
+              <a:t>untuk</a:t>
+            </a:r>
+            <a:r>
+              <a:rPr lang="en-US" dirty="0">
                 <a:ea typeface="+mn-lt"/>
                 <a:cs typeface="+mn-lt"/>
               </a:rPr>
               <a:t> </a:t>
             </a:r>
             <a:r>
-              <a:rPr lang="en-US" err="1">
+              <a:rPr lang="en-US" dirty="0" err="1">
                 <a:ea typeface="+mn-lt"/>
                 <a:cs typeface="+mn-lt"/>
               </a:rPr>
-              <a:t>transisi</a:t>
-            </a:r>
-            <a:r>
-              <a:rPr lang="en-US">
+              <a:t>saling</a:t>
+            </a:r>
+            <a:r>
+              <a:rPr lang="en-US" dirty="0">
                 <a:ea typeface="+mn-lt"/>
                 <a:cs typeface="+mn-lt"/>
               </a:rPr>
-              <a:t> data client-server</a:t>
-            </a:r>
-            <a:endParaRPr lang="en-US"/>
-          </a:p>
-          <a:p>
-            <a:r>
-              <a:rPr lang="en-US">
+              <a:t> </a:t>
+            </a:r>
+            <a:r>
+              <a:rPr lang="en-US" dirty="0" err="1">
                 <a:ea typeface="+mn-lt"/>
                 <a:cs typeface="+mn-lt"/>
               </a:rPr>
-              <a:t>Thread - agar </a:t>
-            </a:r>
-            <a:r>
-              <a:rPr lang="en-US" err="1">
+              <a:t>bertukar</a:t>
+            </a:r>
+            <a:r>
+              <a:rPr lang="en-US" dirty="0">
                 <a:ea typeface="+mn-lt"/>
                 <a:cs typeface="+mn-lt"/>
               </a:rPr>
-              <a:t>bisa</a:t>
-            </a:r>
-            <a:r>
-              <a:rPr lang="en-US">
+              <a:t> </a:t>
+            </a:r>
+            <a:r>
+              <a:rPr lang="en-US" dirty="0" err="1">
                 <a:ea typeface="+mn-lt"/>
                 <a:cs typeface="+mn-lt"/>
               </a:rPr>
-              <a:t> </a:t>
-            </a:r>
-            <a:r>
-              <a:rPr lang="en-US" err="1">
+              <a:t>pesan</a:t>
+            </a:r>
+            <a:endParaRPr lang="en-US" dirty="0">
+              <a:cs typeface="Calibri" panose="020F0502020204030204"/>
+            </a:endParaRPr>
+          </a:p>
+          <a:p>
+            <a:r>
+              <a:rPr lang="en-US" dirty="0">
                 <a:ea typeface="+mn-lt"/>
                 <a:cs typeface="+mn-lt"/>
               </a:rPr>
-              <a:t>menjalankan</a:t>
-            </a:r>
-            <a:r>
-              <a:rPr lang="en-US">
+              <a:t>TCP – </a:t>
+            </a:r>
+            <a:r>
+              <a:rPr lang="en-US" dirty="0" err="1">
                 <a:ea typeface="+mn-lt"/>
                 <a:cs typeface="+mn-lt"/>
               </a:rPr>
-              <a:t> proses </a:t>
-            </a:r>
-            <a:r>
-              <a:rPr lang="en-US" err="1">
+              <a:t>sebagai</a:t>
+            </a:r>
+            <a:r>
+              <a:rPr lang="en-US" dirty="0">
                 <a:ea typeface="+mn-lt"/>
                 <a:cs typeface="+mn-lt"/>
               </a:rPr>
-              <a:t>secara</a:t>
-            </a:r>
-            <a:r>
-              <a:rPr lang="en-US">
+              <a:t> </a:t>
+            </a:r>
+            <a:r>
+              <a:rPr lang="en-US" dirty="0" err="1">
                 <a:ea typeface="+mn-lt"/>
                 <a:cs typeface="+mn-lt"/>
               </a:rPr>
-              <a:t> </a:t>
-            </a:r>
-            <a:r>
-              <a:rPr lang="en-US" err="1">
+              <a:t>transaksi</a:t>
+            </a:r>
+            <a:r>
+              <a:rPr lang="en-US" dirty="0">
                 <a:ea typeface="+mn-lt"/>
                 <a:cs typeface="+mn-lt"/>
               </a:rPr>
-              <a:t>bersamaan</a:t>
-            </a:r>
-            <a:endParaRPr lang="en-US" err="1"/>
+              <a:t> </a:t>
+            </a:r>
+            <a:r>
+              <a:rPr lang="en-US" dirty="0" err="1">
+                <a:ea typeface="+mn-lt"/>
+                <a:cs typeface="+mn-lt"/>
+              </a:rPr>
+              <a:t>pesan</a:t>
+            </a:r>
+            <a:endParaRPr lang="en-US" dirty="0">
+              <a:ea typeface="+mn-lt"/>
+              <a:cs typeface="+mn-lt"/>
+            </a:endParaRPr>
+          </a:p>
+          <a:p>
+            <a:r>
+              <a:rPr lang="en-US" dirty="0">
+                <a:ea typeface="+mn-lt"/>
+                <a:cs typeface="+mn-lt"/>
+              </a:rPr>
+              <a:t>Select - </a:t>
+            </a:r>
+            <a:r>
+              <a:rPr lang="en-US" dirty="0" err="1">
+                <a:ea typeface="+mn-lt"/>
+                <a:cs typeface="+mn-lt"/>
+              </a:rPr>
+              <a:t>untuk</a:t>
+            </a:r>
+            <a:r>
+              <a:rPr lang="en-US" dirty="0">
+                <a:ea typeface="+mn-lt"/>
+                <a:cs typeface="+mn-lt"/>
+              </a:rPr>
+              <a:t> </a:t>
+            </a:r>
+            <a:r>
+              <a:rPr lang="en-US" dirty="0" err="1">
+                <a:ea typeface="+mn-lt"/>
+                <a:cs typeface="+mn-lt"/>
+              </a:rPr>
+              <a:t>menangani</a:t>
+            </a:r>
+            <a:r>
+              <a:rPr lang="en-US" dirty="0">
+                <a:ea typeface="+mn-lt"/>
+                <a:cs typeface="+mn-lt"/>
+              </a:rPr>
+              <a:t> </a:t>
+            </a:r>
+            <a:r>
+              <a:rPr lang="en-US" dirty="0" err="1">
+                <a:ea typeface="+mn-lt"/>
+                <a:cs typeface="+mn-lt"/>
+              </a:rPr>
+              <a:t>banyak</a:t>
+            </a:r>
+            <a:r>
+              <a:rPr lang="en-US" dirty="0">
+                <a:ea typeface="+mn-lt"/>
+                <a:cs typeface="+mn-lt"/>
+              </a:rPr>
+              <a:t> client </a:t>
+            </a:r>
+            <a:r>
+              <a:rPr lang="en-US" dirty="0" err="1">
+                <a:ea typeface="+mn-lt"/>
+                <a:cs typeface="+mn-lt"/>
+              </a:rPr>
+              <a:t>dalam</a:t>
+            </a:r>
+            <a:r>
+              <a:rPr lang="en-US" dirty="0">
+                <a:ea typeface="+mn-lt"/>
+                <a:cs typeface="+mn-lt"/>
+              </a:rPr>
+              <a:t> </a:t>
+            </a:r>
+            <a:r>
+              <a:rPr lang="en-US" dirty="0" err="1">
+                <a:ea typeface="+mn-lt"/>
+                <a:cs typeface="+mn-lt"/>
+              </a:rPr>
+              <a:t>satu</a:t>
+            </a:r>
+            <a:r>
+              <a:rPr lang="en-US" dirty="0">
+                <a:ea typeface="+mn-lt"/>
+                <a:cs typeface="+mn-lt"/>
+              </a:rPr>
+              <a:t> </a:t>
+            </a:r>
+            <a:r>
+              <a:rPr lang="en-US" dirty="0" err="1">
+                <a:ea typeface="+mn-lt"/>
+                <a:cs typeface="+mn-lt"/>
+              </a:rPr>
+              <a:t>waktu</a:t>
+            </a:r>
+            <a:endParaRPr lang="en-US" dirty="0">
+              <a:ea typeface="+mn-lt"/>
+              <a:cs typeface="+mn-lt"/>
+            </a:endParaRPr>
+          </a:p>
+          <a:p>
+            <a:endParaRPr lang="en-US" dirty="0"/>
           </a:p>
         </p:txBody>
       </p:sp>
@@ -7612,24 +7710,61 @@
           <a:lstStyle/>
           <a:p>
             <a:r>
-              <a:rPr lang="en-US"/>
-              <a:t>Socket dan Thread ( Kelompok Carlo dan Raja)</a:t>
-            </a:r>
-            <a:endParaRPr lang="en-US"/>
-          </a:p>
-          <a:p>
-            <a:r>
-              <a:rPr lang="en-US"/>
-              <a:t>HTTP Server , FTP server (Kelompok  Yusuf dan Ilham)</a:t>
-            </a:r>
-            <a:endParaRPr lang="en-US" dirty="0"/>
-          </a:p>
-          <a:p>
-            <a:r>
-              <a:rPr lang="en-US"/>
-              <a:t>Fitur chat dan GUI (Kelompok Christopher dan Alifianissa)</a:t>
-            </a:r>
-            <a:endParaRPr lang="en-US" dirty="0"/>
+              <a:rPr lang="en-US" dirty="0"/>
+              <a:t>Socket dan Thread ( </a:t>
+            </a:r>
+            <a:r>
+              <a:rPr lang="en-US" dirty="0" err="1"/>
+              <a:t>Kelompok</a:t>
+            </a:r>
+            <a:r>
+              <a:rPr lang="en-US" dirty="0"/>
+              <a:t> Carlo dan Raja)</a:t>
+            </a:r>
+          </a:p>
+          <a:p>
+            <a:r>
+              <a:rPr lang="en-US" dirty="0"/>
+              <a:t>Thread, FTP , </a:t>
+            </a:r>
+            <a:r>
+              <a:rPr lang="en-US" dirty="0" err="1"/>
+              <a:t>Gui</a:t>
+            </a:r>
+            <a:r>
+              <a:rPr lang="en-US" dirty="0"/>
+              <a:t> (</a:t>
+            </a:r>
+            <a:r>
+              <a:rPr lang="en-US" dirty="0" err="1"/>
+              <a:t>Kelompok</a:t>
+            </a:r>
+            <a:r>
+              <a:rPr lang="en-US" dirty="0"/>
+              <a:t>  Yusuf dan Ilham)</a:t>
+            </a:r>
+          </a:p>
+          <a:p>
+            <a:r>
+              <a:rPr lang="en-US" dirty="0"/>
+              <a:t>Fitur chat dan GUI (</a:t>
+            </a:r>
+            <a:r>
+              <a:rPr lang="en-US" dirty="0" err="1"/>
+              <a:t>Kelompok</a:t>
+            </a:r>
+            <a:r>
+              <a:rPr lang="en-US" dirty="0"/>
+              <a:t> Christopher dan </a:t>
+            </a:r>
+            <a:r>
+              <a:rPr lang="en-US" dirty="0" err="1"/>
+              <a:t>Alifianissa</a:t>
+            </a:r>
+            <a:r>
+              <a:rPr lang="en-US" dirty="0"/>
+              <a:t>)</a:t>
+            </a:r>
           </a:p>
           <a:p>
             <a:endParaRPr lang="en-US" dirty="0"/>
@@ -7722,7 +7857,7 @@
           <p:nvPr/>
         </p:nvPicPr>
         <p:blipFill>
-          <a:blip r:embed="rId1"/>
+          <a:blip r:embed="rId3"/>
           <a:stretch>
             <a:fillRect/>
           </a:stretch>
@@ -7806,29 +7941,67 @@
           <a:lstStyle/>
           <a:p>
             <a:r>
-              <a:rPr lang="en-US"/>
+              <a:rPr lang="en-US" dirty="0"/>
               <a:t>22 Mei :</a:t>
             </a:r>
-            <a:endParaRPr lang="en-US"/>
-          </a:p>
-          <a:p>
-            <a:r>
-              <a:rPr lang="en-US"/>
-              <a:t>Socket, thread dan http server sudah selesai dikerjakan</a:t>
+          </a:p>
+          <a:p>
+            <a:r>
+              <a:rPr lang="en-US" dirty="0"/>
+              <a:t>Socket, thread dan http server </a:t>
+            </a:r>
+            <a:r>
+              <a:rPr lang="en-US" dirty="0" err="1"/>
+              <a:t>sudah</a:t>
+            </a:r>
+            <a:r>
+              <a:rPr lang="en-US" dirty="0"/>
+              <a:t> </a:t>
+            </a:r>
+            <a:r>
+              <a:rPr lang="en-US" dirty="0" err="1"/>
+              <a:t>selesai</a:t>
+            </a:r>
+            <a:r>
+              <a:rPr lang="en-US" dirty="0"/>
+              <a:t> </a:t>
+            </a:r>
+            <a:r>
+              <a:rPr lang="en-US" dirty="0" err="1"/>
+              <a:t>dikerjakan</a:t>
             </a:r>
             <a:endParaRPr lang="en-US" dirty="0"/>
           </a:p>
           <a:p>
             <a:r>
-              <a:rPr lang="en-US"/>
+              <a:rPr lang="en-US" dirty="0"/>
               <a:t>27 Mei :</a:t>
             </a:r>
-            <a:endParaRPr lang="en-US" dirty="0"/>
-          </a:p>
-          <a:p>
-            <a:r>
-              <a:rPr lang="en-US"/>
-              <a:t>Fitur chat sudah mulai dikerjakan</a:t>
+          </a:p>
+          <a:p>
+            <a:r>
+              <a:rPr lang="en-US" dirty="0"/>
+              <a:t>Fitur chat </a:t>
+            </a:r>
+            <a:r>
+              <a:rPr lang="en-US" dirty="0" err="1"/>
+              <a:t>sudah</a:t>
+            </a:r>
+            <a:r>
+              <a:rPr lang="en-US" dirty="0"/>
+              <a:t> </a:t>
+            </a:r>
+            <a:r>
+              <a:rPr lang="en-US" dirty="0" err="1"/>
+              <a:t>mulai</a:t>
+            </a:r>
+            <a:r>
+              <a:rPr lang="en-US" dirty="0"/>
+              <a:t> </a:t>
+            </a:r>
+            <a:r>
+              <a:rPr lang="en-US" dirty="0" err="1"/>
+              <a:t>dikerjakan</a:t>
             </a:r>
             <a:endParaRPr lang="en-US" dirty="0"/>
           </a:p>
@@ -8103,6 +8276,8 @@
       </a:bgFillStyleLst>
     </a:fmtScheme>
   </a:themeElements>
+  <a:objectDefaults/>
+  <a:extraClrSchemeLst/>
   <a:extLst>
     <a:ext uri="{05A4C25C-085E-4340-85A3-A5531E510DB2}">
       <thm15:themeFamily xmlns:thm15="http://schemas.microsoft.com/office/thememl/2012/main" name="Office Theme" id="{62F939B6-93AF-4DB8-9C6B-D6C7DFDC589F}" vid="{4A3C46E8-61CC-4603-A589-7422A47A8E4A}"/>
@@ -8362,6 +8537,8 @@
       </a:bgFillStyleLst>
     </a:fmtScheme>
   </a:themeElements>
+  <a:objectDefaults/>
+  <a:extraClrSchemeLst/>
   <a:extLst>
     <a:ext uri="{05A4C25C-085E-4340-85A3-A5531E510DB2}">
       <thm15:themeFamily xmlns:thm15="http://schemas.microsoft.com/office/thememl/2012/main" name="Office Theme" id="{62F939B6-93AF-4DB8-9C6B-D6C7DFDC589F}" vid="{4A3C46E8-61CC-4603-A589-7422A47A8E4A}"/>

</xml_diff>